<commit_message>
feat: update slide references
</commit_message>
<xml_diff>
--- a/BOS-PY_Presentation/OverviewOfUsingGeospatialDataInPython.pptx
+++ b/BOS-PY_Presentation/OverviewOfUsingGeospatialDataInPython.pptx
@@ -3142,7 +3142,7 @@
           <a:p>
             <a:fld id="{A906F612-4480-B841-B910-2B9EA0538EA7}" type="datetime1">
               <a:rPr lang="en-US" altLang="zh-TW" smtClean="0"/>
-              <a:t>12/9/20</a:t>
+              <a:t>12/14/20</a:t>
             </a:fld>
             <a:endParaRPr lang="en-US" altLang="zh-TW"/>
           </a:p>
@@ -7893,41 +7893,39 @@
           <a:p>
             <a:pPr lvl="2"/>
             <a:r>
+              <a:rPr lang="en-US" altLang="en-US" sz="1800" b="0" dirty="0"/>
+              <a:t>Documentation:</a:t>
+            </a:r>
+          </a:p>
+          <a:p>
+            <a:pPr lvl="3"/>
+            <a:r>
               <a:rPr lang="en-US" altLang="en-US" sz="1800" b="0" dirty="0" err="1"/>
               <a:t>GeoPandas</a:t>
             </a:r>
             <a:r>
               <a:rPr lang="en-US" altLang="en-US" sz="1800" b="0" dirty="0"/>
-              <a:t> documentation:</a:t>
-            </a:r>
-          </a:p>
-          <a:p>
-            <a:pPr lvl="3"/>
+              <a:t>: </a:t>
+            </a:r>
             <a:r>
               <a:rPr lang="en-US" altLang="en-US" sz="1800" b="0" dirty="0">
                 <a:hlinkClick r:id="rId4"/>
               </a:rPr>
               <a:t>https://geopandas.org/index.html#</a:t>
             </a:r>
+            <a:endParaRPr lang="en-US" altLang="en-US" sz="1800" b="0" dirty="0"/>
+          </a:p>
+          <a:p>
+            <a:pPr lvl="3"/>
             <a:r>
               <a:rPr lang="en-US" altLang="en-US" sz="1800" b="0" dirty="0"/>
-              <a:t> </a:t>
-            </a:r>
-          </a:p>
-          <a:p>
-            <a:pPr lvl="2"/>
-            <a:r>
-              <a:rPr lang="en-US" altLang="en-US" sz="1800" b="0" dirty="0"/>
-              <a:t>Kaggle Geospatial Analysis course (free):</a:t>
-            </a:r>
-          </a:p>
-          <a:p>
-            <a:pPr lvl="3"/>
+              <a:t>folium: </a:t>
+            </a:r>
             <a:r>
               <a:rPr lang="en-US" altLang="en-US" sz="1800" b="0" dirty="0">
                 <a:hlinkClick r:id="rId5"/>
               </a:rPr>
-              <a:t>https://www.kaggle.com/learn/geospatial-analysis</a:t>
+              <a:t>https://python-visualization.github.io/folium/</a:t>
             </a:r>
             <a:endParaRPr lang="en-US" altLang="en-US" sz="1800" b="0" dirty="0"/>
           </a:p>
@@ -7935,7 +7933,15 @@
             <a:pPr lvl="2"/>
             <a:r>
               <a:rPr lang="en-US" sz="1800" b="0" dirty="0"/>
-              <a:t>Codes for most commonly used projections:</a:t>
+              <a:t>Codes for most </a:t>
+            </a:r>
+            <a:r>
+              <a:rPr lang="en-US" sz="1800" b="0"/>
+              <a:t>commonly used CRSs and </a:t>
+            </a:r>
+            <a:r>
+              <a:rPr lang="en-US" sz="1800" b="0" dirty="0"/>
+              <a:t>projections:</a:t>
             </a:r>
           </a:p>
           <a:p>
@@ -7946,16 +7952,13 @@
               </a:rPr>
               <a:t>www.spatialreference.org</a:t>
             </a:r>
+            <a:endParaRPr lang="en-US" altLang="en-US" sz="1800" b="0" dirty="0"/>
+          </a:p>
+          <a:p>
+            <a:pPr lvl="2"/>
             <a:r>
               <a:rPr lang="en-US" altLang="en-US" sz="1800" b="0" dirty="0"/>
-              <a:t> </a:t>
-            </a:r>
-          </a:p>
-          <a:p>
-            <a:pPr lvl="2"/>
-            <a:r>
-              <a:rPr lang="en-US" altLang="en-US" sz="1800" b="0" dirty="0"/>
-              <a:t>Get help on the GIS stack exchange</a:t>
+              <a:t>Learn more with the Kaggle Geospatial Analysis course (free):</a:t>
             </a:r>
           </a:p>
           <a:p>
@@ -7964,12 +7967,26 @@
               <a:rPr lang="en-US" altLang="en-US" sz="1800" b="0" dirty="0">
                 <a:hlinkClick r:id="rId7"/>
               </a:rPr>
+              <a:t>https://www.kaggle.com/learn/geospatial-analysis</a:t>
+            </a:r>
+            <a:endParaRPr lang="en-US" altLang="en-US" sz="1800" b="0" dirty="0"/>
+          </a:p>
+          <a:p>
+            <a:pPr lvl="2"/>
+            <a:r>
+              <a:rPr lang="en-US" altLang="en-US" sz="1800" b="0" dirty="0"/>
+              <a:t>Get help via the GIS stack exchange</a:t>
+            </a:r>
+          </a:p>
+          <a:p>
+            <a:pPr lvl="3"/>
+            <a:r>
+              <a:rPr lang="en-US" altLang="en-US" sz="1800" b="0" dirty="0">
+                <a:hlinkClick r:id="rId8"/>
+              </a:rPr>
               <a:t>https://gis.stackexchange.com/</a:t>
             </a:r>
-            <a:r>
-              <a:rPr lang="en-US" altLang="en-US" sz="1800" b="0" dirty="0"/>
-              <a:t> </a:t>
-            </a:r>
+            <a:endParaRPr lang="en-US" altLang="en-US" sz="1800" b="0" dirty="0"/>
           </a:p>
           <a:p>
             <a:pPr marL="3175" lvl="2" indent="0">
@@ -10051,7 +10068,7 @@
             </a:r>
             <a:r>
               <a:rPr lang="en-US" altLang="en-US" sz="1800" b="0" dirty="0"/>
-              <a:t> API for sites within 50 nautical miles of Boston, MA</a:t>
+              <a:t> API for sites within 100 nautical miles of Boston, MA</a:t>
             </a:r>
           </a:p>
           <a:p>

</xml_diff>

<commit_message>
feat: Update formatting on slides
</commit_message>
<xml_diff>
--- a/BOS-PY_Presentation/OverviewOfUsingGeospatialDataInPython.pptx
+++ b/BOS-PY_Presentation/OverviewOfUsingGeospatialDataInPython.pptx
@@ -3142,7 +3142,7 @@
           <a:p>
             <a:fld id="{A906F612-4480-B841-B910-2B9EA0538EA7}" type="datetime1">
               <a:rPr lang="en-US" altLang="zh-TW" smtClean="0"/>
-              <a:t>12/14/20</a:t>
+              <a:t>12/15/20</a:t>
             </a:fld>
             <a:endParaRPr lang="en-US" altLang="zh-TW"/>
           </a:p>
@@ -8283,172 +8283,6 @@
       </p:sp>
       <p:sp>
         <p:nvSpPr>
-          <p:cNvPr id="18" name="Freeform 17">
-            <a:extLst>
-              <a:ext uri="{FF2B5EF4-FFF2-40B4-BE49-F238E27FC236}">
-                <a16:creationId xmlns:a16="http://schemas.microsoft.com/office/drawing/2014/main" id="{2BBC6805-3F96-3B4C-8C89-6E8F4FD67475}"/>
-              </a:ext>
-            </a:extLst>
-          </p:cNvPr>
-          <p:cNvSpPr/>
-          <p:nvPr/>
-        </p:nvSpPr>
-        <p:spPr>
-          <a:xfrm>
-            <a:off x="7887788" y="3054743"/>
-            <a:ext cx="1944583" cy="1361145"/>
-          </a:xfrm>
-          <a:custGeom>
-            <a:avLst/>
-            <a:gdLst>
-              <a:gd name="connsiteX0" fmla="*/ 0 w 1944583"/>
-              <a:gd name="connsiteY0" fmla="*/ 226903 h 1361145"/>
-              <a:gd name="connsiteX1" fmla="*/ 226903 w 1944583"/>
-              <a:gd name="connsiteY1" fmla="*/ 0 h 1361145"/>
-              <a:gd name="connsiteX2" fmla="*/ 1717680 w 1944583"/>
-              <a:gd name="connsiteY2" fmla="*/ 0 h 1361145"/>
-              <a:gd name="connsiteX3" fmla="*/ 1944583 w 1944583"/>
-              <a:gd name="connsiteY3" fmla="*/ 226903 h 1361145"/>
-              <a:gd name="connsiteX4" fmla="*/ 1944583 w 1944583"/>
-              <a:gd name="connsiteY4" fmla="*/ 1134242 h 1361145"/>
-              <a:gd name="connsiteX5" fmla="*/ 1717680 w 1944583"/>
-              <a:gd name="connsiteY5" fmla="*/ 1361145 h 1361145"/>
-              <a:gd name="connsiteX6" fmla="*/ 226903 w 1944583"/>
-              <a:gd name="connsiteY6" fmla="*/ 1361145 h 1361145"/>
-              <a:gd name="connsiteX7" fmla="*/ 0 w 1944583"/>
-              <a:gd name="connsiteY7" fmla="*/ 1134242 h 1361145"/>
-              <a:gd name="connsiteX8" fmla="*/ 0 w 1944583"/>
-              <a:gd name="connsiteY8" fmla="*/ 226903 h 1361145"/>
-            </a:gdLst>
-            <a:ahLst/>
-            <a:cxnLst>
-              <a:cxn ang="0">
-                <a:pos x="connsiteX0" y="connsiteY0"/>
-              </a:cxn>
-              <a:cxn ang="0">
-                <a:pos x="connsiteX1" y="connsiteY1"/>
-              </a:cxn>
-              <a:cxn ang="0">
-                <a:pos x="connsiteX2" y="connsiteY2"/>
-              </a:cxn>
-              <a:cxn ang="0">
-                <a:pos x="connsiteX3" y="connsiteY3"/>
-              </a:cxn>
-              <a:cxn ang="0">
-                <a:pos x="connsiteX4" y="connsiteY4"/>
-              </a:cxn>
-              <a:cxn ang="0">
-                <a:pos x="connsiteX5" y="connsiteY5"/>
-              </a:cxn>
-              <a:cxn ang="0">
-                <a:pos x="connsiteX6" y="connsiteY6"/>
-              </a:cxn>
-              <a:cxn ang="0">
-                <a:pos x="connsiteX7" y="connsiteY7"/>
-              </a:cxn>
-              <a:cxn ang="0">
-                <a:pos x="connsiteX8" y="connsiteY8"/>
-              </a:cxn>
-            </a:cxnLst>
-            <a:rect l="l" t="t" r="r" b="b"/>
-            <a:pathLst>
-              <a:path w="1944583" h="1361145">
-                <a:moveTo>
-                  <a:pt x="0" y="226903"/>
-                </a:moveTo>
-                <a:cubicBezTo>
-                  <a:pt x="0" y="101588"/>
-                  <a:pt x="101588" y="0"/>
-                  <a:pt x="226903" y="0"/>
-                </a:cubicBezTo>
-                <a:lnTo>
-                  <a:pt x="1717680" y="0"/>
-                </a:lnTo>
-                <a:cubicBezTo>
-                  <a:pt x="1842995" y="0"/>
-                  <a:pt x="1944583" y="101588"/>
-                  <a:pt x="1944583" y="226903"/>
-                </a:cubicBezTo>
-                <a:lnTo>
-                  <a:pt x="1944583" y="1134242"/>
-                </a:lnTo>
-                <a:cubicBezTo>
-                  <a:pt x="1944583" y="1259557"/>
-                  <a:pt x="1842995" y="1361145"/>
-                  <a:pt x="1717680" y="1361145"/>
-                </a:cubicBezTo>
-                <a:lnTo>
-                  <a:pt x="226903" y="1361145"/>
-                </a:lnTo>
-                <a:cubicBezTo>
-                  <a:pt x="101588" y="1361145"/>
-                  <a:pt x="0" y="1259557"/>
-                  <a:pt x="0" y="1134242"/>
-                </a:cubicBezTo>
-                <a:lnTo>
-                  <a:pt x="0" y="226903"/>
-                </a:lnTo>
-                <a:close/>
-              </a:path>
-            </a:pathLst>
-          </a:custGeom>
-        </p:spPr>
-        <p:style>
-          <a:lnRef idx="2">
-            <a:schemeClr val="lt1">
-              <a:hueOff val="0"/>
-              <a:satOff val="0"/>
-              <a:lumOff val="0"/>
-              <a:alphaOff val="0"/>
-            </a:schemeClr>
-          </a:lnRef>
-          <a:fillRef idx="1">
-            <a:schemeClr val="accent6">
-              <a:hueOff val="0"/>
-              <a:satOff val="0"/>
-              <a:lumOff val="0"/>
-              <a:alphaOff val="0"/>
-            </a:schemeClr>
-          </a:fillRef>
-          <a:effectRef idx="0">
-            <a:schemeClr val="accent6">
-              <a:hueOff val="0"/>
-              <a:satOff val="0"/>
-              <a:lumOff val="0"/>
-              <a:alphaOff val="0"/>
-            </a:schemeClr>
-          </a:effectRef>
-          <a:fontRef idx="minor">
-            <a:schemeClr val="lt1"/>
-          </a:fontRef>
-        </p:style>
-        <p:txBody>
-          <a:bodyPr spcFirstLastPara="0" vert="horz" wrap="square" lIns="157898" tIns="157898" rIns="157898" bIns="157898" numCol="1" spcCol="1270" anchor="ctr" anchorCtr="0">
-            <a:noAutofit/>
-          </a:bodyPr>
-          <a:lstStyle/>
-          <a:p>
-            <a:pPr marL="0" lvl="0" indent="0" algn="ctr" defTabSz="1066800">
-              <a:lnSpc>
-                <a:spcPct val="90000"/>
-              </a:lnSpc>
-              <a:spcBef>
-                <a:spcPct val="0"/>
-              </a:spcBef>
-              <a:spcAft>
-                <a:spcPct val="35000"/>
-              </a:spcAft>
-              <a:buNone/>
-            </a:pPr>
-            <a:r>
-              <a:rPr lang="en-US" sz="2400" kern="1200" dirty="0"/>
-              <a:t>Python Code Examples</a:t>
-            </a:r>
-          </a:p>
-        </p:txBody>
-      </p:sp>
-      <p:sp>
-        <p:nvSpPr>
           <p:cNvPr id="10" name="Multiply 9">
             <a:extLst>
               <a:ext uri="{FF2B5EF4-FFF2-40B4-BE49-F238E27FC236}">
@@ -9329,6 +9163,172 @@
             <a:r>
               <a:rPr lang="en-US" sz="2400" kern="1200" dirty="0"/>
               <a:t>Geospatial Ecosystem &amp; Theory</a:t>
+            </a:r>
+          </a:p>
+        </p:txBody>
+      </p:sp>
+      <p:sp>
+        <p:nvSpPr>
+          <p:cNvPr id="18" name="Freeform 17">
+            <a:extLst>
+              <a:ext uri="{FF2B5EF4-FFF2-40B4-BE49-F238E27FC236}">
+                <a16:creationId xmlns:a16="http://schemas.microsoft.com/office/drawing/2014/main" id="{2BBC6805-3F96-3B4C-8C89-6E8F4FD67475}"/>
+              </a:ext>
+            </a:extLst>
+          </p:cNvPr>
+          <p:cNvSpPr/>
+          <p:nvPr/>
+        </p:nvSpPr>
+        <p:spPr>
+          <a:xfrm>
+            <a:off x="7887788" y="3054743"/>
+            <a:ext cx="1944583" cy="1361145"/>
+          </a:xfrm>
+          <a:custGeom>
+            <a:avLst/>
+            <a:gdLst>
+              <a:gd name="connsiteX0" fmla="*/ 0 w 1944583"/>
+              <a:gd name="connsiteY0" fmla="*/ 226903 h 1361145"/>
+              <a:gd name="connsiteX1" fmla="*/ 226903 w 1944583"/>
+              <a:gd name="connsiteY1" fmla="*/ 0 h 1361145"/>
+              <a:gd name="connsiteX2" fmla="*/ 1717680 w 1944583"/>
+              <a:gd name="connsiteY2" fmla="*/ 0 h 1361145"/>
+              <a:gd name="connsiteX3" fmla="*/ 1944583 w 1944583"/>
+              <a:gd name="connsiteY3" fmla="*/ 226903 h 1361145"/>
+              <a:gd name="connsiteX4" fmla="*/ 1944583 w 1944583"/>
+              <a:gd name="connsiteY4" fmla="*/ 1134242 h 1361145"/>
+              <a:gd name="connsiteX5" fmla="*/ 1717680 w 1944583"/>
+              <a:gd name="connsiteY5" fmla="*/ 1361145 h 1361145"/>
+              <a:gd name="connsiteX6" fmla="*/ 226903 w 1944583"/>
+              <a:gd name="connsiteY6" fmla="*/ 1361145 h 1361145"/>
+              <a:gd name="connsiteX7" fmla="*/ 0 w 1944583"/>
+              <a:gd name="connsiteY7" fmla="*/ 1134242 h 1361145"/>
+              <a:gd name="connsiteX8" fmla="*/ 0 w 1944583"/>
+              <a:gd name="connsiteY8" fmla="*/ 226903 h 1361145"/>
+            </a:gdLst>
+            <a:ahLst/>
+            <a:cxnLst>
+              <a:cxn ang="0">
+                <a:pos x="connsiteX0" y="connsiteY0"/>
+              </a:cxn>
+              <a:cxn ang="0">
+                <a:pos x="connsiteX1" y="connsiteY1"/>
+              </a:cxn>
+              <a:cxn ang="0">
+                <a:pos x="connsiteX2" y="connsiteY2"/>
+              </a:cxn>
+              <a:cxn ang="0">
+                <a:pos x="connsiteX3" y="connsiteY3"/>
+              </a:cxn>
+              <a:cxn ang="0">
+                <a:pos x="connsiteX4" y="connsiteY4"/>
+              </a:cxn>
+              <a:cxn ang="0">
+                <a:pos x="connsiteX5" y="connsiteY5"/>
+              </a:cxn>
+              <a:cxn ang="0">
+                <a:pos x="connsiteX6" y="connsiteY6"/>
+              </a:cxn>
+              <a:cxn ang="0">
+                <a:pos x="connsiteX7" y="connsiteY7"/>
+              </a:cxn>
+              <a:cxn ang="0">
+                <a:pos x="connsiteX8" y="connsiteY8"/>
+              </a:cxn>
+            </a:cxnLst>
+            <a:rect l="l" t="t" r="r" b="b"/>
+            <a:pathLst>
+              <a:path w="1944583" h="1361145">
+                <a:moveTo>
+                  <a:pt x="0" y="226903"/>
+                </a:moveTo>
+                <a:cubicBezTo>
+                  <a:pt x="0" y="101588"/>
+                  <a:pt x="101588" y="0"/>
+                  <a:pt x="226903" y="0"/>
+                </a:cubicBezTo>
+                <a:lnTo>
+                  <a:pt x="1717680" y="0"/>
+                </a:lnTo>
+                <a:cubicBezTo>
+                  <a:pt x="1842995" y="0"/>
+                  <a:pt x="1944583" y="101588"/>
+                  <a:pt x="1944583" y="226903"/>
+                </a:cubicBezTo>
+                <a:lnTo>
+                  <a:pt x="1944583" y="1134242"/>
+                </a:lnTo>
+                <a:cubicBezTo>
+                  <a:pt x="1944583" y="1259557"/>
+                  <a:pt x="1842995" y="1361145"/>
+                  <a:pt x="1717680" y="1361145"/>
+                </a:cubicBezTo>
+                <a:lnTo>
+                  <a:pt x="226903" y="1361145"/>
+                </a:lnTo>
+                <a:cubicBezTo>
+                  <a:pt x="101588" y="1361145"/>
+                  <a:pt x="0" y="1259557"/>
+                  <a:pt x="0" y="1134242"/>
+                </a:cubicBezTo>
+                <a:lnTo>
+                  <a:pt x="0" y="226903"/>
+                </a:lnTo>
+                <a:close/>
+              </a:path>
+            </a:pathLst>
+          </a:custGeom>
+        </p:spPr>
+        <p:style>
+          <a:lnRef idx="2">
+            <a:schemeClr val="lt1">
+              <a:hueOff val="0"/>
+              <a:satOff val="0"/>
+              <a:lumOff val="0"/>
+              <a:alphaOff val="0"/>
+            </a:schemeClr>
+          </a:lnRef>
+          <a:fillRef idx="1">
+            <a:schemeClr val="accent6">
+              <a:hueOff val="0"/>
+              <a:satOff val="0"/>
+              <a:lumOff val="0"/>
+              <a:alphaOff val="0"/>
+            </a:schemeClr>
+          </a:fillRef>
+          <a:effectRef idx="0">
+            <a:schemeClr val="accent6">
+              <a:hueOff val="0"/>
+              <a:satOff val="0"/>
+              <a:lumOff val="0"/>
+              <a:alphaOff val="0"/>
+            </a:schemeClr>
+          </a:effectRef>
+          <a:fontRef idx="minor">
+            <a:schemeClr val="lt1"/>
+          </a:fontRef>
+        </p:style>
+        <p:txBody>
+          <a:bodyPr spcFirstLastPara="0" vert="horz" wrap="square" lIns="157898" tIns="157898" rIns="157898" bIns="157898" numCol="1" spcCol="1270" anchor="ctr" anchorCtr="0">
+            <a:noAutofit/>
+          </a:bodyPr>
+          <a:lstStyle/>
+          <a:p>
+            <a:pPr marL="0" lvl="0" indent="0" algn="ctr" defTabSz="1066800">
+              <a:lnSpc>
+                <a:spcPct val="90000"/>
+              </a:lnSpc>
+              <a:spcBef>
+                <a:spcPct val="0"/>
+              </a:spcBef>
+              <a:spcAft>
+                <a:spcPct val="35000"/>
+              </a:spcAft>
+              <a:buNone/>
+            </a:pPr>
+            <a:r>
+              <a:rPr lang="en-US" sz="2400" kern="1200" dirty="0"/>
+              <a:t>Python Code Examples</a:t>
             </a:r>
           </a:p>
         </p:txBody>

</xml_diff>

<commit_message>
feat: update slides for new assumptions and formatting
</commit_message>
<xml_diff>
--- a/BOS-PY_Presentation/OverviewOfUsingGeospatialDataInPython.pptx
+++ b/BOS-PY_Presentation/OverviewOfUsingGeospatialDataInPython.pptx
@@ -10068,7 +10068,7 @@
             </a:r>
             <a:r>
               <a:rPr lang="en-US" altLang="en-US" sz="1800" b="0" dirty="0"/>
-              <a:t> API for sites within 100 nautical miles of Boston, MA</a:t>
+              <a:t> API for sites within 75 nautical miles of Boston, MA</a:t>
             </a:r>
           </a:p>
           <a:p>
@@ -10387,7 +10387,7 @@
                 </a:solidFill>
                 <a:latin typeface="Frutiger 45 Light" pitchFamily="34" charset="0"/>
               </a:rPr>
-              <a:t>Part of the Massachusetts coastline is known as the “Ocean’s Graveyard”</a:t>
+              <a:t>There’s a 50 mile stretch of coastline along Cape Cod that has claimed over 3,000 vessels and is not-so-affectionately known as the “Ocean’s Graveyard”</a:t>
             </a:r>
           </a:p>
         </p:txBody>
@@ -11622,7 +11622,7 @@
         <p:spPr bwMode="auto">
           <a:xfrm>
             <a:off x="2829257" y="1618325"/>
-            <a:ext cx="3200400" cy="969496"/>
+            <a:ext cx="3200400" cy="692497"/>
           </a:xfrm>
           <a:prstGeom prst="rect">
             <a:avLst/>
@@ -11687,13 +11687,8 @@
             </a:pPr>
             <a:r>
               <a:rPr lang="en-US" altLang="en-US" sz="1800" b="0" dirty="0"/>
-              <a:t>Points, lines, polygons, and </a:t>
-            </a:r>
-            <a:r>
-              <a:rPr lang="en-US" altLang="en-US" sz="1800" b="0" dirty="0" err="1"/>
-              <a:t>multipolygons</a:t>
-            </a:r>
-            <a:endParaRPr lang="en-US" altLang="en-US" sz="1800" b="0" dirty="0"/>
+              <a:t>Points, lines, polygons</a:t>
+            </a:r>
           </a:p>
         </p:txBody>
       </p:sp>

</xml_diff>

<commit_message>
feat: slide and code updates
</commit_message>
<xml_diff>
--- a/BOS-PY_Presentation/OverviewOfUsingGeospatialDataInPython.pptx
+++ b/BOS-PY_Presentation/OverviewOfUsingGeospatialDataInPython.pptx
@@ -3142,7 +3142,7 @@
           <a:p>
             <a:fld id="{A906F612-4480-B841-B910-2B9EA0538EA7}" type="datetime1">
               <a:rPr lang="en-US" altLang="zh-TW" smtClean="0"/>
-              <a:t>12/15/20</a:t>
+              <a:t>12/16/20</a:t>
             </a:fld>
             <a:endParaRPr lang="en-US" altLang="zh-TW"/>
           </a:p>
@@ -13182,6 +13182,20 @@
             <a:pPr lvl="2"/>
             <a:r>
               <a:rPr lang="en-US" altLang="en-US" sz="1800" b="0" dirty="0"/>
+              <a:t>Golden rule: know thy data! Know the coordinate system used for your data and convert datasets into the same CRS before combining</a:t>
+            </a:r>
+          </a:p>
+          <a:p>
+            <a:pPr lvl="3"/>
+            <a:r>
+              <a:rPr lang="en-US" altLang="en-US" sz="1800" b="0" dirty="0"/>
+              <a:t>The CRS is like the “unit” of geospatial data</a:t>
+            </a:r>
+          </a:p>
+          <a:p>
+            <a:pPr lvl="2"/>
+            <a:r>
+              <a:rPr lang="en-US" altLang="en-US" sz="1800" b="0" dirty="0"/>
               <a:t>Examples of coordinate reference systems:</a:t>
             </a:r>
           </a:p>
@@ -13205,20 +13219,6 @@
             <a:r>
               <a:rPr lang="en-US" altLang="en-US" sz="1800" b="0" dirty="0"/>
               <a:t>Others: NAD83, ITRF</a:t>
-            </a:r>
-          </a:p>
-          <a:p>
-            <a:pPr lvl="2"/>
-            <a:r>
-              <a:rPr lang="en-US" altLang="en-US" sz="1800" b="0" dirty="0"/>
-              <a:t>Golden rule: know thy data! Know the coordinate system used for your data and convert datasets into the same CRS before combining</a:t>
-            </a:r>
-          </a:p>
-          <a:p>
-            <a:pPr lvl="3"/>
-            <a:r>
-              <a:rPr lang="en-US" altLang="en-US" sz="1800" b="0" dirty="0"/>
-              <a:t>The CRS is like the “unit” of geospatial data</a:t>
             </a:r>
           </a:p>
         </p:txBody>
@@ -14022,7 +14022,7 @@
         </p:nvSpPr>
         <p:spPr bwMode="gray">
           <a:xfrm>
-            <a:off x="861992" y="3539101"/>
+            <a:off x="861992" y="3216368"/>
             <a:ext cx="5463504" cy="2237625"/>
           </a:xfrm>
           <a:prstGeom prst="rect">
@@ -14335,8 +14335,11 @@
             </a:r>
             <a:r>
               <a:rPr lang="en-US" altLang="en-US" sz="1800" b="0" dirty="0"/>
-              <a:t>), </a:t>
-            </a:r>
+              <a:t>)</a:t>
+            </a:r>
+          </a:p>
+          <a:p>
+            <a:pPr lvl="3"/>
             <a:r>
               <a:rPr lang="en-US" altLang="en-US" sz="1800" b="0" dirty="0" err="1"/>
               <a:t>Cartopy</a:t>
@@ -14383,7 +14386,7 @@
         </p:blipFill>
         <p:spPr>
           <a:xfrm>
-            <a:off x="1935547" y="2009030"/>
+            <a:off x="2882223" y="2009030"/>
             <a:ext cx="1001283" cy="1001283"/>
           </a:xfrm>
           <a:prstGeom prst="rect">
@@ -14413,7 +14416,7 @@
         </p:blipFill>
         <p:spPr>
           <a:xfrm>
-            <a:off x="2736848" y="2182801"/>
+            <a:off x="3683524" y="2182801"/>
             <a:ext cx="2437504" cy="641876"/>
           </a:xfrm>
           <a:prstGeom prst="rect">
@@ -14443,7 +14446,7 @@
         </p:blipFill>
         <p:spPr>
           <a:xfrm>
-            <a:off x="4333205" y="2940734"/>
+            <a:off x="5787616" y="5104327"/>
             <a:ext cx="2496372" cy="1249684"/>
           </a:xfrm>
           <a:prstGeom prst="rect">
@@ -14473,7 +14476,7 @@
         </p:blipFill>
         <p:spPr>
           <a:xfrm>
-            <a:off x="6626098" y="1832898"/>
+            <a:off x="5968368" y="2785601"/>
             <a:ext cx="3050745" cy="2029941"/>
           </a:xfrm>
           <a:prstGeom prst="rect">

</xml_diff>